<commit_message>
database write up, finaldoc changes, and pres
updates..
</commit_message>
<xml_diff>
--- a/Documentation/Pres.pptx
+++ b/Documentation/Pres.pptx
@@ -318,7 +318,7 @@
           <a:p>
             <a:fld id="{FE3A95D5-F2B9-42F8-8912-B870847ACF91}" type="datetimeFigureOut">
               <a:rPr lang="en-US" smtClean="0"/>
-              <a:t>4/20/2017</a:t>
+              <a:t>4/24/2017</a:t>
             </a:fld>
             <a:endParaRPr lang="en-US" dirty="0"/>
           </a:p>
@@ -528,7 +528,7 @@
           <a:p>
             <a:fld id="{FE3A95D5-F2B9-42F8-8912-B870847ACF91}" type="datetimeFigureOut">
               <a:rPr lang="en-US" smtClean="0"/>
-              <a:t>4/20/2017</a:t>
+              <a:t>4/24/2017</a:t>
             </a:fld>
             <a:endParaRPr lang="en-US" dirty="0"/>
           </a:p>
@@ -708,7 +708,7 @@
           <a:p>
             <a:fld id="{FE3A95D5-F2B9-42F8-8912-B870847ACF91}" type="datetimeFigureOut">
               <a:rPr lang="en-US" smtClean="0"/>
-              <a:t>4/20/2017</a:t>
+              <a:t>4/24/2017</a:t>
             </a:fld>
             <a:endParaRPr lang="en-US" dirty="0"/>
           </a:p>
@@ -878,7 +878,7 @@
           <a:p>
             <a:fld id="{FE3A95D5-F2B9-42F8-8912-B870847ACF91}" type="datetimeFigureOut">
               <a:rPr lang="en-US" smtClean="0"/>
-              <a:t>4/20/2017</a:t>
+              <a:t>4/24/2017</a:t>
             </a:fld>
             <a:endParaRPr lang="en-US" dirty="0"/>
           </a:p>
@@ -1132,7 +1132,7 @@
           <a:p>
             <a:fld id="{FE3A95D5-F2B9-42F8-8912-B870847ACF91}" type="datetimeFigureOut">
               <a:rPr lang="en-US" smtClean="0"/>
-              <a:t>4/20/2017</a:t>
+              <a:t>4/24/2017</a:t>
             </a:fld>
             <a:endParaRPr lang="en-US" dirty="0"/>
           </a:p>
@@ -1458,7 +1458,7 @@
           <a:p>
             <a:fld id="{FE3A95D5-F2B9-42F8-8912-B870847ACF91}" type="datetimeFigureOut">
               <a:rPr lang="en-US" smtClean="0"/>
-              <a:t>4/20/2017</a:t>
+              <a:t>4/24/2017</a:t>
             </a:fld>
             <a:endParaRPr lang="en-US" dirty="0"/>
           </a:p>
@@ -1909,7 +1909,7 @@
           <a:p>
             <a:fld id="{FE3A95D5-F2B9-42F8-8912-B870847ACF91}" type="datetimeFigureOut">
               <a:rPr lang="en-US" smtClean="0"/>
-              <a:t>4/20/2017</a:t>
+              <a:t>4/24/2017</a:t>
             </a:fld>
             <a:endParaRPr lang="en-US" dirty="0"/>
           </a:p>
@@ -2027,7 +2027,7 @@
           <a:p>
             <a:fld id="{FE3A95D5-F2B9-42F8-8912-B870847ACF91}" type="datetimeFigureOut">
               <a:rPr lang="en-US" smtClean="0"/>
-              <a:t>4/20/2017</a:t>
+              <a:t>4/24/2017</a:t>
             </a:fld>
             <a:endParaRPr lang="en-US" dirty="0"/>
           </a:p>
@@ -2122,7 +2122,7 @@
           <a:p>
             <a:fld id="{FE3A95D5-F2B9-42F8-8912-B870847ACF91}" type="datetimeFigureOut">
               <a:rPr lang="en-US" smtClean="0"/>
-              <a:t>4/20/2017</a:t>
+              <a:t>4/24/2017</a:t>
             </a:fld>
             <a:endParaRPr lang="en-US" dirty="0"/>
           </a:p>
@@ -2409,7 +2409,7 @@
           <a:p>
             <a:fld id="{FE3A95D5-F2B9-42F8-8912-B870847ACF91}" type="datetimeFigureOut">
               <a:rPr lang="en-US" smtClean="0"/>
-              <a:t>4/20/2017</a:t>
+              <a:t>4/24/2017</a:t>
             </a:fld>
             <a:endParaRPr lang="en-US" dirty="0"/>
           </a:p>
@@ -2726,7 +2726,7 @@
           <a:p>
             <a:fld id="{FE3A95D5-F2B9-42F8-8912-B870847ACF91}" type="datetimeFigureOut">
               <a:rPr lang="en-US" smtClean="0"/>
-              <a:t>4/20/2017</a:t>
+              <a:t>4/24/2017</a:t>
             </a:fld>
             <a:endParaRPr lang="en-US" dirty="0"/>
           </a:p>
@@ -2978,7 +2978,7 @@
           <a:p>
             <a:fld id="{FE3A95D5-F2B9-42F8-8912-B870847ACF91}" type="datetimeFigureOut">
               <a:rPr lang="en-US" smtClean="0"/>
-              <a:t>4/20/2017</a:t>
+              <a:t>4/24/2017</a:t>
             </a:fld>
             <a:endParaRPr lang="en-US" dirty="0"/>
           </a:p>
@@ -4962,6 +4962,45 @@
             </a:r>
           </a:p>
           <a:p>
+            <a:r>
+              <a:rPr lang="en-US" sz="2800" b="1" dirty="0" smtClean="0">
+                <a:solidFill>
+                  <a:schemeClr val="tx1"/>
+                </a:solidFill>
+              </a:rPr>
+              <a:t>Cloud: </a:t>
+            </a:r>
+            <a:r>
+              <a:rPr lang="en-US" sz="2800" dirty="0" smtClean="0">
+                <a:solidFill>
+                  <a:schemeClr val="tx1"/>
+                </a:solidFill>
+              </a:rPr>
+              <a:t>Digital </a:t>
+            </a:r>
+            <a:r>
+              <a:rPr lang="en-US" sz="2800" dirty="0">
+                <a:solidFill>
+                  <a:schemeClr val="tx1"/>
+                </a:solidFill>
+              </a:rPr>
+              <a:t>Ocean </a:t>
+            </a:r>
+            <a:r>
+              <a:rPr lang="en-US" sz="2800" smtClean="0">
+                <a:solidFill>
+                  <a:schemeClr val="tx1"/>
+                </a:solidFill>
+              </a:rPr>
+              <a:t>(Droplet)</a:t>
+            </a:r>
+            <a:endParaRPr lang="en-US" sz="2800" dirty="0" smtClean="0">
+              <a:solidFill>
+                <a:schemeClr val="tx1"/>
+              </a:solidFill>
+            </a:endParaRPr>
+          </a:p>
+          <a:p>
             <a:endParaRPr lang="en-US" sz="2800" dirty="0">
               <a:solidFill>
                 <a:schemeClr val="tx1"/>

</xml_diff>

<commit_message>
final doc and databserationale -> FinalDocument folder
just to organize the files.
</commit_message>
<xml_diff>
--- a/Documentation/Pres.pptx
+++ b/Documentation/Pres.pptx
@@ -11,16 +11,17 @@
     <p:sldId id="258" r:id="rId5"/>
     <p:sldId id="259" r:id="rId6"/>
     <p:sldId id="260" r:id="rId7"/>
-    <p:sldId id="271" r:id="rId8"/>
-    <p:sldId id="261" r:id="rId9"/>
-    <p:sldId id="265" r:id="rId10"/>
-    <p:sldId id="266" r:id="rId11"/>
-    <p:sldId id="262" r:id="rId12"/>
-    <p:sldId id="267" r:id="rId13"/>
-    <p:sldId id="268" r:id="rId14"/>
-    <p:sldId id="263" r:id="rId15"/>
-    <p:sldId id="269" r:id="rId16"/>
-    <p:sldId id="264" r:id="rId17"/>
+    <p:sldId id="272" r:id="rId8"/>
+    <p:sldId id="271" r:id="rId9"/>
+    <p:sldId id="261" r:id="rId10"/>
+    <p:sldId id="265" r:id="rId11"/>
+    <p:sldId id="266" r:id="rId12"/>
+    <p:sldId id="262" r:id="rId13"/>
+    <p:sldId id="267" r:id="rId14"/>
+    <p:sldId id="268" r:id="rId15"/>
+    <p:sldId id="263" r:id="rId16"/>
+    <p:sldId id="269" r:id="rId17"/>
+    <p:sldId id="264" r:id="rId18"/>
   </p:sldIdLst>
   <p:sldSz cx="12192000" cy="6858000"/>
   <p:notesSz cx="6858000" cy="9144000"/>
@@ -3927,7 +3928,7 @@
     </p:spTree>
     <p:extLst>
       <p:ext uri="{BB962C8B-B14F-4D97-AF65-F5344CB8AC3E}">
-        <p14:creationId xmlns:p14="http://schemas.microsoft.com/office/powerpoint/2010/main" val="1464017751"/>
+        <p14:creationId xmlns:p14="http://schemas.microsoft.com/office/powerpoint/2010/main" val="1249477557"/>
       </p:ext>
     </p:extLst>
   </p:cSld>
@@ -3976,10 +3977,7 @@
           <a:bodyPr/>
           <a:lstStyle/>
           <a:p>
-            <a:r>
-              <a:rPr lang="en-US" dirty="0"/>
-              <a:t>Sequence Diagram</a:t>
-            </a:r>
+            <a:endParaRPr lang="en-US" dirty="0"/>
           </a:p>
         </p:txBody>
       </p:sp>
@@ -4005,7 +4003,7 @@
     </p:spTree>
     <p:extLst>
       <p:ext uri="{BB962C8B-B14F-4D97-AF65-F5344CB8AC3E}">
-        <p14:creationId xmlns:p14="http://schemas.microsoft.com/office/powerpoint/2010/main" val="933408625"/>
+        <p14:creationId xmlns:p14="http://schemas.microsoft.com/office/powerpoint/2010/main" val="1464017751"/>
       </p:ext>
     </p:extLst>
   </p:cSld>
@@ -4054,7 +4052,10 @@
           <a:bodyPr/>
           <a:lstStyle/>
           <a:p>
-            <a:endParaRPr lang="en-US" dirty="0"/>
+            <a:r>
+              <a:rPr lang="en-US" dirty="0"/>
+              <a:t>Sequence Diagram</a:t>
+            </a:r>
           </a:p>
         </p:txBody>
       </p:sp>
@@ -4080,7 +4081,7 @@
     </p:spTree>
     <p:extLst>
       <p:ext uri="{BB962C8B-B14F-4D97-AF65-F5344CB8AC3E}">
-        <p14:creationId xmlns:p14="http://schemas.microsoft.com/office/powerpoint/2010/main" val="1641730598"/>
+        <p14:creationId xmlns:p14="http://schemas.microsoft.com/office/powerpoint/2010/main" val="933408625"/>
       </p:ext>
     </p:extLst>
   </p:cSld>
@@ -4155,7 +4156,7 @@
     </p:spTree>
     <p:extLst>
       <p:ext uri="{BB962C8B-B14F-4D97-AF65-F5344CB8AC3E}">
-        <p14:creationId xmlns:p14="http://schemas.microsoft.com/office/powerpoint/2010/main" val="2752761651"/>
+        <p14:creationId xmlns:p14="http://schemas.microsoft.com/office/powerpoint/2010/main" val="1641730598"/>
       </p:ext>
     </p:extLst>
   </p:cSld>
@@ -4199,34 +4200,38 @@
             <p:ph type="title"/>
           </p:nvPr>
         </p:nvSpPr>
-        <p:spPr>
-          <a:xfrm>
-            <a:off x="1921748" y="2034632"/>
-            <a:ext cx="7486203" cy="2584502"/>
-          </a:xfrm>
-        </p:spPr>
-        <p:txBody>
-          <a:bodyPr>
-            <a:normAutofit/>
-          </a:bodyPr>
-          <a:lstStyle/>
-          <a:p>
-            <a:pPr algn="ctr"/>
-            <a:r>
-              <a:rPr lang="en-US" sz="7200" dirty="0"/>
-              <a:t>Demonstration</a:t>
-            </a:r>
-            <a:br>
-              <a:rPr lang="en-US" sz="7200" dirty="0"/>
-            </a:br>
-            <a:endParaRPr lang="en-US" sz="7200" dirty="0"/>
+        <p:spPr/>
+        <p:txBody>
+          <a:bodyPr/>
+          <a:lstStyle/>
+          <a:p>
+            <a:endParaRPr lang="en-US" dirty="0"/>
+          </a:p>
+        </p:txBody>
+      </p:sp>
+      <p:sp>
+        <p:nvSpPr>
+          <p:cNvPr id="3" name="Content Placeholder 2"/>
+          <p:cNvSpPr>
+            <a:spLocks noGrp="1"/>
+          </p:cNvSpPr>
+          <p:nvPr>
+            <p:ph idx="1"/>
+          </p:nvPr>
+        </p:nvSpPr>
+        <p:spPr/>
+        <p:txBody>
+          <a:bodyPr/>
+          <a:lstStyle/>
+          <a:p>
+            <a:endParaRPr lang="en-US" dirty="0"/>
           </a:p>
         </p:txBody>
       </p:sp>
     </p:spTree>
     <p:extLst>
       <p:ext uri="{BB962C8B-B14F-4D97-AF65-F5344CB8AC3E}">
-        <p14:creationId xmlns:p14="http://schemas.microsoft.com/office/powerpoint/2010/main" val="1363176424"/>
+        <p14:creationId xmlns:p14="http://schemas.microsoft.com/office/powerpoint/2010/main" val="2752761651"/>
       </p:ext>
     </p:extLst>
   </p:cSld>
@@ -4270,6 +4275,77 @@
             <p:ph type="title"/>
           </p:nvPr>
         </p:nvSpPr>
+        <p:spPr>
+          <a:xfrm>
+            <a:off x="1921748" y="2034632"/>
+            <a:ext cx="7486203" cy="2584502"/>
+          </a:xfrm>
+        </p:spPr>
+        <p:txBody>
+          <a:bodyPr>
+            <a:normAutofit/>
+          </a:bodyPr>
+          <a:lstStyle/>
+          <a:p>
+            <a:pPr algn="ctr"/>
+            <a:r>
+              <a:rPr lang="en-US" sz="7200" dirty="0"/>
+              <a:t>Demonstration</a:t>
+            </a:r>
+            <a:br>
+              <a:rPr lang="en-US" sz="7200" dirty="0"/>
+            </a:br>
+            <a:endParaRPr lang="en-US" sz="7200" dirty="0"/>
+          </a:p>
+        </p:txBody>
+      </p:sp>
+    </p:spTree>
+    <p:extLst>
+      <p:ext uri="{BB962C8B-B14F-4D97-AF65-F5344CB8AC3E}">
+        <p14:creationId xmlns:p14="http://schemas.microsoft.com/office/powerpoint/2010/main" val="1363176424"/>
+      </p:ext>
+    </p:extLst>
+  </p:cSld>
+  <p:clrMapOvr>
+    <a:masterClrMapping/>
+  </p:clrMapOvr>
+  <p:timing>
+    <p:tnLst>
+      <p:par>
+        <p:cTn id="1" dur="indefinite" restart="never" nodeType="tmRoot"/>
+      </p:par>
+    </p:tnLst>
+  </p:timing>
+</p:sld>
+</file>
+
+<file path=ppt/slides/slide16.xml><?xml version="1.0" encoding="utf-8"?>
+<p:sld xmlns:a="http://schemas.openxmlformats.org/drawingml/2006/main" xmlns:r="http://schemas.openxmlformats.org/officeDocument/2006/relationships" xmlns:p="http://schemas.openxmlformats.org/presentationml/2006/main">
+  <p:cSld>
+    <p:spTree>
+      <p:nvGrpSpPr>
+        <p:cNvPr id="1" name=""/>
+        <p:cNvGrpSpPr/>
+        <p:nvPr/>
+      </p:nvGrpSpPr>
+      <p:grpSpPr>
+        <a:xfrm>
+          <a:off x="0" y="0"/>
+          <a:ext cx="0" cy="0"/>
+          <a:chOff x="0" y="0"/>
+          <a:chExt cx="0" cy="0"/>
+        </a:xfrm>
+      </p:grpSpPr>
+      <p:sp>
+        <p:nvSpPr>
+          <p:cNvPr id="2" name="Title 1"/>
+          <p:cNvSpPr>
+            <a:spLocks noGrp="1"/>
+          </p:cNvSpPr>
+          <p:nvPr>
+            <p:ph type="title"/>
+          </p:nvPr>
+        </p:nvSpPr>
         <p:spPr/>
         <p:txBody>
           <a:bodyPr/>
@@ -4322,7 +4398,7 @@
 </p:sld>
 </file>
 
-<file path=ppt/slides/slide16.xml><?xml version="1.0" encoding="utf-8"?>
+<file path=ppt/slides/slide17.xml><?xml version="1.0" encoding="utf-8"?>
 <p:sld xmlns:a="http://schemas.openxmlformats.org/drawingml/2006/main" xmlns:r="http://schemas.openxmlformats.org/officeDocument/2006/relationships" xmlns:p="http://schemas.openxmlformats.org/presentationml/2006/main">
   <p:cSld>
     <p:spTree>
@@ -5063,82 +5139,36 @@
           <a:p>
             <a:r>
               <a:rPr lang="en-US" dirty="0" smtClean="0"/>
-              <a:t>Timeline and Metrics</a:t>
-            </a:r>
-            <a:endParaRPr lang="en-US" dirty="0"/>
-          </a:p>
-        </p:txBody>
-      </p:sp>
-      <p:sp>
-        <p:nvSpPr>
-          <p:cNvPr id="3" name="Content Placeholder 2"/>
-          <p:cNvSpPr>
-            <a:spLocks noGrp="1"/>
-          </p:cNvSpPr>
-          <p:nvPr>
-            <p:ph idx="1"/>
-          </p:nvPr>
-        </p:nvSpPr>
-        <p:spPr/>
-        <p:txBody>
-          <a:bodyPr/>
-          <a:lstStyle/>
-          <a:p>
-            <a:r>
-              <a:rPr lang="en-US" dirty="0" smtClean="0">
-                <a:solidFill>
-                  <a:schemeClr val="tx1"/>
-                </a:solidFill>
-              </a:rPr>
-              <a:t>Code: breakdown of # of  lines</a:t>
-            </a:r>
-          </a:p>
-          <a:p>
-            <a:r>
-              <a:rPr lang="en-US" dirty="0" smtClean="0">
-                <a:solidFill>
-                  <a:schemeClr val="tx1"/>
-                </a:solidFill>
-              </a:rPr>
-              <a:t>Final Report: 30~pages</a:t>
-            </a:r>
-          </a:p>
-          <a:p>
-            <a:endParaRPr lang="en-US" dirty="0">
-              <a:solidFill>
-                <a:schemeClr val="tx1"/>
-              </a:solidFill>
-            </a:endParaRPr>
-          </a:p>
-          <a:p>
-            <a:r>
-              <a:rPr lang="en-US" dirty="0" smtClean="0">
-                <a:solidFill>
-                  <a:schemeClr val="tx1"/>
-                </a:solidFill>
-              </a:rPr>
-              <a:t>(*add a graph*)</a:t>
-            </a:r>
-          </a:p>
-          <a:p>
-            <a:r>
-              <a:rPr lang="en-US" dirty="0" smtClean="0">
-                <a:solidFill>
-                  <a:schemeClr val="tx1"/>
-                </a:solidFill>
-              </a:rPr>
-              <a:t>COCOMO</a:t>
-            </a:r>
-          </a:p>
-          <a:p>
-            <a:endParaRPr lang="en-US" dirty="0" smtClean="0">
-              <a:solidFill>
-                <a:schemeClr val="tx1"/>
-              </a:solidFill>
-            </a:endParaRPr>
-          </a:p>
-        </p:txBody>
-      </p:sp>
+              <a:t>Metrics</a:t>
+            </a:r>
+            <a:endParaRPr lang="en-US" dirty="0"/>
+          </a:p>
+        </p:txBody>
+      </p:sp>
+      <p:pic>
+        <p:nvPicPr>
+          <p:cNvPr id="6" name="Picture 5"/>
+          <p:cNvPicPr>
+            <a:picLocks noChangeAspect="1"/>
+          </p:cNvPicPr>
+          <p:nvPr/>
+        </p:nvPicPr>
+        <p:blipFill>
+          <a:blip r:embed="rId2"/>
+          <a:stretch>
+            <a:fillRect/>
+          </a:stretch>
+        </p:blipFill>
+        <p:spPr>
+          <a:xfrm>
+            <a:off x="1882107" y="1923081"/>
+            <a:ext cx="6921896" cy="3808522"/>
+          </a:xfrm>
+          <a:prstGeom prst="rect">
+            <a:avLst/>
+          </a:prstGeom>
+        </p:spPr>
+      </p:pic>
     </p:spTree>
     <p:extLst>
       <p:ext uri="{BB962C8B-B14F-4D97-AF65-F5344CB8AC3E}">
@@ -5186,69 +5216,58 @@
             <p:ph type="title"/>
           </p:nvPr>
         </p:nvSpPr>
-        <p:spPr/>
+        <p:spPr>
+          <a:xfrm>
+            <a:off x="974551" y="610351"/>
+            <a:ext cx="9692640" cy="1428929"/>
+          </a:xfrm>
+        </p:spPr>
         <p:txBody>
           <a:bodyPr/>
           <a:lstStyle/>
           <a:p>
             <a:r>
               <a:rPr lang="en-US" dirty="0" smtClean="0"/>
-              <a:t>System Model	</a:t>
-            </a:r>
-            <a:endParaRPr lang="en-US" dirty="0"/>
-          </a:p>
-        </p:txBody>
-      </p:sp>
-      <p:sp>
-        <p:nvSpPr>
-          <p:cNvPr id="3" name="Content Placeholder 2"/>
-          <p:cNvSpPr>
-            <a:spLocks noGrp="1"/>
-          </p:cNvSpPr>
-          <p:nvPr>
-            <p:ph idx="1"/>
-          </p:nvPr>
-        </p:nvSpPr>
-        <p:spPr/>
-        <p:txBody>
-          <a:bodyPr/>
-          <a:lstStyle/>
-          <a:p>
-            <a:r>
-              <a:rPr lang="en-US" dirty="0" smtClean="0">
-                <a:solidFill>
-                  <a:schemeClr val="tx1"/>
-                </a:solidFill>
-              </a:rPr>
-              <a:t>Server and client</a:t>
-            </a:r>
-          </a:p>
-          <a:p>
-            <a:endParaRPr lang="en-US" dirty="0">
-              <a:solidFill>
-                <a:schemeClr val="tx1"/>
-              </a:solidFill>
-            </a:endParaRPr>
-          </a:p>
-        </p:txBody>
-      </p:sp>
+              <a:t>Metrics</a:t>
+            </a:r>
+            <a:endParaRPr lang="en-US" dirty="0"/>
+          </a:p>
+        </p:txBody>
+      </p:sp>
+      <p:pic>
+        <p:nvPicPr>
+          <p:cNvPr id="4" name="Picture 3"/>
+          <p:cNvPicPr>
+            <a:picLocks noChangeAspect="1"/>
+          </p:cNvPicPr>
+          <p:nvPr/>
+        </p:nvPicPr>
+        <p:blipFill>
+          <a:blip r:embed="rId2"/>
+          <a:stretch>
+            <a:fillRect/>
+          </a:stretch>
+        </p:blipFill>
+        <p:spPr>
+          <a:xfrm>
+            <a:off x="1363171" y="2506128"/>
+            <a:ext cx="8915400" cy="3286125"/>
+          </a:xfrm>
+          <a:prstGeom prst="rect">
+            <a:avLst/>
+          </a:prstGeom>
+        </p:spPr>
+      </p:pic>
     </p:spTree>
     <p:extLst>
       <p:ext uri="{BB962C8B-B14F-4D97-AF65-F5344CB8AC3E}">
-        <p14:creationId xmlns:p14="http://schemas.microsoft.com/office/powerpoint/2010/main" val="701488306"/>
+        <p14:creationId xmlns:p14="http://schemas.microsoft.com/office/powerpoint/2010/main" val="3546343266"/>
       </p:ext>
     </p:extLst>
   </p:cSld>
   <p:clrMapOvr>
     <a:masterClrMapping/>
   </p:clrMapOvr>
-  <p:timing>
-    <p:tnLst>
-      <p:par>
-        <p:cTn id="1" dur="indefinite" restart="never" nodeType="tmRoot"/>
-      </p:par>
-    </p:tnLst>
-  </p:timing>
 </p:sld>
 </file>
 
@@ -5286,12 +5305,9 @@
           <a:p>
             <a:r>
               <a:rPr lang="en-US" dirty="0" smtClean="0"/>
-              <a:t>UML </a:t>
-            </a:r>
-            <a:r>
-              <a:rPr lang="en-US" dirty="0"/>
-              <a:t>Diagram</a:t>
-            </a:r>
+              <a:t>System Model	</a:t>
+            </a:r>
+            <a:endParaRPr lang="en-US" dirty="0"/>
           </a:p>
         </p:txBody>
       </p:sp>
@@ -5310,14 +5326,28 @@
           <a:bodyPr/>
           <a:lstStyle/>
           <a:p>
-            <a:endParaRPr lang="en-US" dirty="0"/>
+            <a:r>
+              <a:rPr lang="en-US" dirty="0" smtClean="0">
+                <a:solidFill>
+                  <a:schemeClr val="tx1"/>
+                </a:solidFill>
+              </a:rPr>
+              <a:t>Server and client</a:t>
+            </a:r>
+          </a:p>
+          <a:p>
+            <a:endParaRPr lang="en-US" dirty="0">
+              <a:solidFill>
+                <a:schemeClr val="tx1"/>
+              </a:solidFill>
+            </a:endParaRPr>
           </a:p>
         </p:txBody>
       </p:sp>
     </p:spTree>
     <p:extLst>
       <p:ext uri="{BB962C8B-B14F-4D97-AF65-F5344CB8AC3E}">
-        <p14:creationId xmlns:p14="http://schemas.microsoft.com/office/powerpoint/2010/main" val="3239136265"/>
+        <p14:creationId xmlns:p14="http://schemas.microsoft.com/office/powerpoint/2010/main" val="701488306"/>
       </p:ext>
     </p:extLst>
   </p:cSld>
@@ -5366,7 +5396,14 @@
           <a:bodyPr/>
           <a:lstStyle/>
           <a:p>
-            <a:endParaRPr lang="en-US" dirty="0"/>
+            <a:r>
+              <a:rPr lang="en-US" dirty="0" smtClean="0"/>
+              <a:t>UML </a:t>
+            </a:r>
+            <a:r>
+              <a:rPr lang="en-US" dirty="0"/>
+              <a:t>Diagram</a:t>
+            </a:r>
           </a:p>
         </p:txBody>
       </p:sp>
@@ -5392,7 +5429,7 @@
     </p:spTree>
     <p:extLst>
       <p:ext uri="{BB962C8B-B14F-4D97-AF65-F5344CB8AC3E}">
-        <p14:creationId xmlns:p14="http://schemas.microsoft.com/office/powerpoint/2010/main" val="1249477557"/>
+        <p14:creationId xmlns:p14="http://schemas.microsoft.com/office/powerpoint/2010/main" val="3239136265"/>
       </p:ext>
     </p:extLst>
   </p:cSld>

</xml_diff>